<commit_message>
FORMAT corrected SRNTGT 071
</commit_message>
<xml_diff>
--- a/INTEL/Target Folders/SRN/SRNTGT089 SCUD Facility.pptx
+++ b/INTEL/Target Folders/SRN/SRNTGT089 SCUD Facility.pptx
@@ -111,7 +111,7 @@
   </p:defaultTextStyle>
   <p:extLst>
     <p:ext uri="{EFAFB233-063F-42B5-8137-9DF3F51BA10A}">
-      <p15:sldGuideLst xmlns:p15="http://schemas.microsoft.com/office/powerpoint/2012/main" xmlns="">
+      <p15:sldGuideLst xmlns:p15="http://schemas.microsoft.com/office/powerpoint/2012/main">
         <p15:guide id="1" orient="horz" pos="1620">
           <p15:clr>
             <a:srgbClr val="A4A3A4"/>
@@ -211,7 +211,7 @@
             <a:fld id="{40637A30-8EE1-4060-9976-8832FC89EE34}" type="datetimeFigureOut">
               <a:rPr lang="nb-NO" smtClean="0"/>
               <a:pPr/>
-              <a:t>03.01.2025</a:t>
+              <a:t>04.01.2025</a:t>
             </a:fld>
             <a:endParaRPr lang="nb-NO"/>
           </a:p>
@@ -3801,7 +3801,7 @@
           <p:cNvPr id="13" name="Kép 12">
             <a:extLst>
               <a:ext uri="{FF2B5EF4-FFF2-40B4-BE49-F238E27FC236}">
-                <a16:creationId xmlns:a16="http://schemas.microsoft.com/office/drawing/2014/main" xmlns="" id="{795207EB-3669-07E5-38D3-A3FCEC16DDD2}"/>
+                <a16:creationId xmlns:a16="http://schemas.microsoft.com/office/drawing/2014/main" id="{795207EB-3669-07E5-38D3-A3FCEC16DDD2}"/>
               </a:ext>
             </a:extLst>
           </p:cNvPr>
@@ -3833,7 +3833,7 @@
           <p:cNvPr id="11" name="Kép 10">
             <a:extLst>
               <a:ext uri="{FF2B5EF4-FFF2-40B4-BE49-F238E27FC236}">
-                <a16:creationId xmlns:a16="http://schemas.microsoft.com/office/drawing/2014/main" xmlns="" id="{B478E8CA-9F45-BD09-52E4-9A64FDFA68F4}"/>
+                <a16:creationId xmlns:a16="http://schemas.microsoft.com/office/drawing/2014/main" id="{B478E8CA-9F45-BD09-52E4-9A64FDFA68F4}"/>
               </a:ext>
             </a:extLst>
           </p:cNvPr>
@@ -3952,7 +3952,7 @@
                   <a:schemeClr val="tx1"/>
                 </a:solidFill>
               </a:rPr>
-              <a:t>DESCRIPTION OF THE DESIRED POINTS OF IMPACT WITH WPN TYPE:</a:t>
+              <a:t>DESCRIPTION OF THE DESIRED POINTS OF IMPACT</a:t>
             </a:r>
             <a:endParaRPr lang="hu-HU" sz="1100">
               <a:solidFill>
@@ -4243,7 +4243,7 @@
           <p:cNvPr id="21" name="Prostokąt 33">
             <a:extLst>
               <a:ext uri="{FF2B5EF4-FFF2-40B4-BE49-F238E27FC236}">
-                <a16:creationId xmlns:a16="http://schemas.microsoft.com/office/drawing/2014/main" xmlns="" id="{E49849C0-5340-FFB1-A5AC-D1BDAE90C0E4}"/>
+                <a16:creationId xmlns:a16="http://schemas.microsoft.com/office/drawing/2014/main" id="{E49849C0-5340-FFB1-A5AC-D1BDAE90C0E4}"/>
               </a:ext>
             </a:extLst>
           </p:cNvPr>
@@ -4382,7 +4382,7 @@
           <p:cNvPr id="33" name="Prostokąt 36">
             <a:extLst>
               <a:ext uri="{FF2B5EF4-FFF2-40B4-BE49-F238E27FC236}">
-                <a16:creationId xmlns:a16="http://schemas.microsoft.com/office/drawing/2014/main" xmlns="" id="{436C7B94-5D55-3D78-833F-99BA8488EC5C}"/>
+                <a16:creationId xmlns:a16="http://schemas.microsoft.com/office/drawing/2014/main" id="{436C7B94-5D55-3D78-833F-99BA8488EC5C}"/>
               </a:ext>
             </a:extLst>
           </p:cNvPr>
@@ -4468,7 +4468,7 @@
           <p:cNvPr id="39" name="Háromszög 38">
             <a:extLst>
               <a:ext uri="{FF2B5EF4-FFF2-40B4-BE49-F238E27FC236}">
-                <a16:creationId xmlns:a16="http://schemas.microsoft.com/office/drawing/2014/main" xmlns="" id="{599FE571-AEAA-6E24-C9CB-1CDF64FC0761}"/>
+                <a16:creationId xmlns:a16="http://schemas.microsoft.com/office/drawing/2014/main" id="{599FE571-AEAA-6E24-C9CB-1CDF64FC0761}"/>
               </a:ext>
             </a:extLst>
           </p:cNvPr>
@@ -4520,7 +4520,7 @@
           <p:cNvPr id="51" name="Téglalap 50">
             <a:extLst>
               <a:ext uri="{FF2B5EF4-FFF2-40B4-BE49-F238E27FC236}">
-                <a16:creationId xmlns:a16="http://schemas.microsoft.com/office/drawing/2014/main" xmlns="" id="{849F8394-CDE0-9EB4-0A10-314515E83EC0}"/>
+                <a16:creationId xmlns:a16="http://schemas.microsoft.com/office/drawing/2014/main" id="{849F8394-CDE0-9EB4-0A10-314515E83EC0}"/>
               </a:ext>
             </a:extLst>
           </p:cNvPr>
@@ -4571,7 +4571,7 @@
           <p:cNvPr id="4" name="Kép 3">
             <a:extLst>
               <a:ext uri="{FF2B5EF4-FFF2-40B4-BE49-F238E27FC236}">
-                <a16:creationId xmlns:a16="http://schemas.microsoft.com/office/drawing/2014/main" xmlns="" id="{2582332E-BE2D-6281-C5B6-D4E7E034C860}"/>
+                <a16:creationId xmlns:a16="http://schemas.microsoft.com/office/drawing/2014/main" id="{2582332E-BE2D-6281-C5B6-D4E7E034C860}"/>
               </a:ext>
             </a:extLst>
           </p:cNvPr>
@@ -4584,7 +4584,7 @@
           <a:blip r:embed="rId4" cstate="print">
             <a:extLst>
               <a:ext uri="{28A0092B-C50C-407E-A947-70E740481C1C}">
-                <a14:useLocalDpi xmlns:a14="http://schemas.microsoft.com/office/drawing/2010/main" xmlns="" val="0"/>
+                <a14:useLocalDpi xmlns:a14="http://schemas.microsoft.com/office/drawing/2010/main" val="0"/>
               </a:ext>
             </a:extLst>
           </a:blip>
@@ -4607,7 +4607,7 @@
           <p:cNvPr id="6" name="Kép 5">
             <a:extLst>
               <a:ext uri="{FF2B5EF4-FFF2-40B4-BE49-F238E27FC236}">
-                <a16:creationId xmlns:a16="http://schemas.microsoft.com/office/drawing/2014/main" xmlns="" id="{8F557E24-D936-7AF1-2207-47EEDE09D66A}"/>
+                <a16:creationId xmlns:a16="http://schemas.microsoft.com/office/drawing/2014/main" id="{8F557E24-D936-7AF1-2207-47EEDE09D66A}"/>
               </a:ext>
             </a:extLst>
           </p:cNvPr>
@@ -4620,7 +4620,7 @@
           <a:blip r:embed="rId5" cstate="print">
             <a:extLst>
               <a:ext uri="{28A0092B-C50C-407E-A947-70E740481C1C}">
-                <a14:useLocalDpi xmlns:a14="http://schemas.microsoft.com/office/drawing/2010/main" xmlns="" val="0"/>
+                <a14:useLocalDpi xmlns:a14="http://schemas.microsoft.com/office/drawing/2010/main" val="0"/>
               </a:ext>
             </a:extLst>
           </a:blip>
@@ -4643,7 +4643,7 @@
           <p:cNvPr id="17" name="Prostokąt 33">
             <a:extLst>
               <a:ext uri="{FF2B5EF4-FFF2-40B4-BE49-F238E27FC236}">
-                <a16:creationId xmlns:a16="http://schemas.microsoft.com/office/drawing/2014/main" xmlns="" id="{0C119320-E844-2356-CE88-5BE9128D3F54}"/>
+                <a16:creationId xmlns:a16="http://schemas.microsoft.com/office/drawing/2014/main" id="{0C119320-E844-2356-CE88-5BE9128D3F54}"/>
               </a:ext>
             </a:extLst>
           </p:cNvPr>
@@ -4733,7 +4733,7 @@
           <p:cNvPr id="18" name="Straight Arrow Connector 51">
             <a:extLst>
               <a:ext uri="{FF2B5EF4-FFF2-40B4-BE49-F238E27FC236}">
-                <a16:creationId xmlns:a16="http://schemas.microsoft.com/office/drawing/2014/main" xmlns="" id="{2957189A-8EAC-6CA2-3F49-BDC76160A06F}"/>
+                <a16:creationId xmlns:a16="http://schemas.microsoft.com/office/drawing/2014/main" id="{2957189A-8EAC-6CA2-3F49-BDC76160A06F}"/>
               </a:ext>
             </a:extLst>
           </p:cNvPr>
@@ -4779,7 +4779,7 @@
           <p:cNvPr id="20" name="Prostokąt 33">
             <a:extLst>
               <a:ext uri="{FF2B5EF4-FFF2-40B4-BE49-F238E27FC236}">
-                <a16:creationId xmlns:a16="http://schemas.microsoft.com/office/drawing/2014/main" xmlns="" id="{D14162A1-C602-9651-EA6D-E5E59993497E}"/>
+                <a16:creationId xmlns:a16="http://schemas.microsoft.com/office/drawing/2014/main" id="{D14162A1-C602-9651-EA6D-E5E59993497E}"/>
               </a:ext>
             </a:extLst>
           </p:cNvPr>
@@ -4869,7 +4869,7 @@
           <p:cNvPr id="22" name="Prostokąt 33">
             <a:extLst>
               <a:ext uri="{FF2B5EF4-FFF2-40B4-BE49-F238E27FC236}">
-                <a16:creationId xmlns:a16="http://schemas.microsoft.com/office/drawing/2014/main" xmlns="" id="{933EC81A-1BD1-2A9F-470A-866B8D012D26}"/>
+                <a16:creationId xmlns:a16="http://schemas.microsoft.com/office/drawing/2014/main" id="{933EC81A-1BD1-2A9F-470A-866B8D012D26}"/>
               </a:ext>
             </a:extLst>
           </p:cNvPr>
@@ -4959,7 +4959,7 @@
           <p:cNvPr id="24" name="Straight Arrow Connector 51">
             <a:extLst>
               <a:ext uri="{FF2B5EF4-FFF2-40B4-BE49-F238E27FC236}">
-                <a16:creationId xmlns:a16="http://schemas.microsoft.com/office/drawing/2014/main" xmlns="" id="{0218E878-AE98-0B97-D16B-F2588A59B547}"/>
+                <a16:creationId xmlns:a16="http://schemas.microsoft.com/office/drawing/2014/main" id="{0218E878-AE98-0B97-D16B-F2588A59B547}"/>
               </a:ext>
             </a:extLst>
           </p:cNvPr>
@@ -5003,7 +5003,7 @@
           <p:cNvPr id="27" name="Straight Arrow Connector 51">
             <a:extLst>
               <a:ext uri="{FF2B5EF4-FFF2-40B4-BE49-F238E27FC236}">
-                <a16:creationId xmlns:a16="http://schemas.microsoft.com/office/drawing/2014/main" xmlns="" id="{D29197B5-311F-7DD6-4223-AE047302F212}"/>
+                <a16:creationId xmlns:a16="http://schemas.microsoft.com/office/drawing/2014/main" id="{D29197B5-311F-7DD6-4223-AE047302F212}"/>
               </a:ext>
             </a:extLst>
           </p:cNvPr>
@@ -5049,7 +5049,7 @@
           <p:cNvPr id="32" name="Szabadkézi sokszög: alakzat 31">
             <a:extLst>
               <a:ext uri="{FF2B5EF4-FFF2-40B4-BE49-F238E27FC236}">
-                <a16:creationId xmlns:a16="http://schemas.microsoft.com/office/drawing/2014/main" xmlns="" id="{3D98A03A-12E4-CF5D-944A-ECFA2C4D2E3F}"/>
+                <a16:creationId xmlns:a16="http://schemas.microsoft.com/office/drawing/2014/main" id="{3D98A03A-12E4-CF5D-944A-ECFA2C4D2E3F}"/>
               </a:ext>
             </a:extLst>
           </p:cNvPr>
@@ -5152,7 +5152,7 @@
           <p:cNvPr id="35" name="Szabadkézi sokszög: alakzat 34">
             <a:extLst>
               <a:ext uri="{FF2B5EF4-FFF2-40B4-BE49-F238E27FC236}">
-                <a16:creationId xmlns:a16="http://schemas.microsoft.com/office/drawing/2014/main" xmlns="" id="{C47978EF-5F7A-BC35-CE9A-89F76FD3BE67}"/>
+                <a16:creationId xmlns:a16="http://schemas.microsoft.com/office/drawing/2014/main" id="{C47978EF-5F7A-BC35-CE9A-89F76FD3BE67}"/>
               </a:ext>
             </a:extLst>
           </p:cNvPr>
@@ -5259,7 +5259,7 @@
           <p:cNvPr id="36" name="Szabadkézi sokszög: alakzat 35">
             <a:extLst>
               <a:ext uri="{FF2B5EF4-FFF2-40B4-BE49-F238E27FC236}">
-                <a16:creationId xmlns:a16="http://schemas.microsoft.com/office/drawing/2014/main" xmlns="" id="{BC27F3A5-BBE1-1C7B-A337-2033D6C6A3E8}"/>
+                <a16:creationId xmlns:a16="http://schemas.microsoft.com/office/drawing/2014/main" id="{BC27F3A5-BBE1-1C7B-A337-2033D6C6A3E8}"/>
               </a:ext>
             </a:extLst>
           </p:cNvPr>
@@ -5362,7 +5362,7 @@
           <p:cNvPr id="38" name="Szabadkézi sokszög: alakzat 37">
             <a:extLst>
               <a:ext uri="{FF2B5EF4-FFF2-40B4-BE49-F238E27FC236}">
-                <a16:creationId xmlns:a16="http://schemas.microsoft.com/office/drawing/2014/main" xmlns="" id="{FD98C947-9DCC-BA3A-178D-19E8C5D0DC12}"/>
+                <a16:creationId xmlns:a16="http://schemas.microsoft.com/office/drawing/2014/main" id="{FD98C947-9DCC-BA3A-178D-19E8C5D0DC12}"/>
               </a:ext>
             </a:extLst>
           </p:cNvPr>
@@ -5465,7 +5465,7 @@
           <p:cNvPr id="44" name="Téglalap 43">
             <a:extLst>
               <a:ext uri="{FF2B5EF4-FFF2-40B4-BE49-F238E27FC236}">
-                <a16:creationId xmlns:a16="http://schemas.microsoft.com/office/drawing/2014/main" xmlns="" id="{27DA4757-DBD8-0B4D-ADDE-10CCC0C49967}"/>
+                <a16:creationId xmlns:a16="http://schemas.microsoft.com/office/drawing/2014/main" id="{27DA4757-DBD8-0B4D-ADDE-10CCC0C49967}"/>
               </a:ext>
             </a:extLst>
           </p:cNvPr>
@@ -5527,7 +5527,7 @@
         <p:cNvPr id="1" name="">
           <a:extLst>
             <a:ext uri="{FF2B5EF4-FFF2-40B4-BE49-F238E27FC236}">
-              <a16:creationId xmlns:a16="http://schemas.microsoft.com/office/drawing/2014/main" xmlns="" id="{CC7AE187-F9B5-598F-AC85-BACD21D80A97}"/>
+              <a16:creationId xmlns:a16="http://schemas.microsoft.com/office/drawing/2014/main" id="{CC7AE187-F9B5-598F-AC85-BACD21D80A97}"/>
             </a:ext>
           </a:extLst>
         </p:cNvPr>
@@ -5547,7 +5547,7 @@
           <p:cNvPr id="13" name="Kép 12">
             <a:extLst>
               <a:ext uri="{FF2B5EF4-FFF2-40B4-BE49-F238E27FC236}">
-                <a16:creationId xmlns:a16="http://schemas.microsoft.com/office/drawing/2014/main" xmlns="" id="{5C62DF22-54F8-22D9-A644-1507AD1ABAAB}"/>
+                <a16:creationId xmlns:a16="http://schemas.microsoft.com/office/drawing/2014/main" id="{5C62DF22-54F8-22D9-A644-1507AD1ABAAB}"/>
               </a:ext>
             </a:extLst>
           </p:cNvPr>
@@ -5579,7 +5579,7 @@
           <p:cNvPr id="2" name="Tittel 1">
             <a:extLst>
               <a:ext uri="{FF2B5EF4-FFF2-40B4-BE49-F238E27FC236}">
-                <a16:creationId xmlns:a16="http://schemas.microsoft.com/office/drawing/2014/main" xmlns="" id="{AA724D68-8815-FF9F-119F-0EDFD1C1281B}"/>
+                <a16:creationId xmlns:a16="http://schemas.microsoft.com/office/drawing/2014/main" id="{AA724D68-8815-FF9F-119F-0EDFD1C1281B}"/>
               </a:ext>
             </a:extLst>
           </p:cNvPr>
@@ -5626,7 +5626,7 @@
           <p:cNvPr id="37" name="Prostokąt 36">
             <a:extLst>
               <a:ext uri="{FF2B5EF4-FFF2-40B4-BE49-F238E27FC236}">
-                <a16:creationId xmlns:a16="http://schemas.microsoft.com/office/drawing/2014/main" xmlns="" id="{B5460009-0817-623C-012E-7208E7630A51}"/>
+                <a16:creationId xmlns:a16="http://schemas.microsoft.com/office/drawing/2014/main" id="{B5460009-0817-623C-012E-7208E7630A51}"/>
               </a:ext>
             </a:extLst>
           </p:cNvPr>
@@ -5680,7 +5680,7 @@
                   <a:schemeClr val="tx1"/>
                 </a:solidFill>
               </a:rPr>
-              <a:t>DESCRIPTION OF THE DESIRED POINTS OF IMPACT WITH WPN TYPE:</a:t>
+              <a:t>DESCRIPTION OF THE DESIRED POINTS OF IMPACT </a:t>
             </a:r>
             <a:endParaRPr lang="hu-HU" sz="1100">
               <a:solidFill>
@@ -5995,7 +5995,7 @@
           <p:cNvPr id="52" name="Straight Arrow Connector 51">
             <a:extLst>
               <a:ext uri="{FF2B5EF4-FFF2-40B4-BE49-F238E27FC236}">
-                <a16:creationId xmlns:a16="http://schemas.microsoft.com/office/drawing/2014/main" xmlns="" id="{7B038B3F-CB37-4A1D-C4D2-A6417E838AB9}"/>
+                <a16:creationId xmlns:a16="http://schemas.microsoft.com/office/drawing/2014/main" id="{7B038B3F-CB37-4A1D-C4D2-A6417E838AB9}"/>
               </a:ext>
             </a:extLst>
           </p:cNvPr>
@@ -6041,7 +6041,7 @@
           <p:cNvPr id="21" name="Prostokąt 33">
             <a:extLst>
               <a:ext uri="{FF2B5EF4-FFF2-40B4-BE49-F238E27FC236}">
-                <a16:creationId xmlns:a16="http://schemas.microsoft.com/office/drawing/2014/main" xmlns="" id="{E2BABC2C-6F56-E2D0-CF98-95052FCE85DE}"/>
+                <a16:creationId xmlns:a16="http://schemas.microsoft.com/office/drawing/2014/main" id="{E2BABC2C-6F56-E2D0-CF98-95052FCE85DE}"/>
               </a:ext>
             </a:extLst>
           </p:cNvPr>
@@ -6131,7 +6131,7 @@
           <p:cNvPr id="55" name="Pil opp 2">
             <a:extLst>
               <a:ext uri="{FF2B5EF4-FFF2-40B4-BE49-F238E27FC236}">
-                <a16:creationId xmlns:a16="http://schemas.microsoft.com/office/drawing/2014/main" xmlns="" id="{973C69C4-027D-842B-3670-3C2FB9394EC5}"/>
+                <a16:creationId xmlns:a16="http://schemas.microsoft.com/office/drawing/2014/main" id="{973C69C4-027D-842B-3670-3C2FB9394EC5}"/>
               </a:ext>
             </a:extLst>
           </p:cNvPr>
@@ -6186,7 +6186,7 @@
           <p:cNvPr id="33" name="Prostokąt 36">
             <a:extLst>
               <a:ext uri="{FF2B5EF4-FFF2-40B4-BE49-F238E27FC236}">
-                <a16:creationId xmlns:a16="http://schemas.microsoft.com/office/drawing/2014/main" xmlns="" id="{31262739-4A1D-C1AB-53B5-EA214C304090}"/>
+                <a16:creationId xmlns:a16="http://schemas.microsoft.com/office/drawing/2014/main" id="{31262739-4A1D-C1AB-53B5-EA214C304090}"/>
               </a:ext>
             </a:extLst>
           </p:cNvPr>
@@ -6195,8 +6195,8 @@
         </p:nvSpPr>
         <p:spPr>
           <a:xfrm>
-            <a:off x="5626235" y="789075"/>
-            <a:ext cx="3390950" cy="3133299"/>
+            <a:off x="5252557" y="789075"/>
+            <a:ext cx="3764628" cy="3133299"/>
           </a:xfrm>
           <a:prstGeom prst="rect">
             <a:avLst/>
@@ -6234,37 +6234,14 @@
           </a:bodyPr>
           <a:lstStyle/>
           <a:p>
+            <a:pPr algn="ctr"/>
             <a:r>
               <a:rPr lang="en-US" sz="1100">
                 <a:solidFill>
                   <a:schemeClr val="tx1"/>
                 </a:solidFill>
               </a:rPr>
-              <a:t>SRNTGT089 </a:t>
-            </a:r>
-            <a:r>
-              <a:rPr lang="en-US" sz="1100" b="1">
-                <a:solidFill>
-                  <a:schemeClr val="tx1"/>
-                </a:solidFill>
-              </a:rPr>
-              <a:t>A</a:t>
-            </a:r>
-            <a:r>
-              <a:rPr lang="hu-HU" sz="1100" b="1">
-                <a:solidFill>
-                  <a:schemeClr val="tx1"/>
-                </a:solidFill>
-              </a:rPr>
-              <a:t>-1</a:t>
-            </a:r>
-            <a:r>
-              <a:rPr lang="en-US" sz="1100">
-                <a:solidFill>
-                  <a:schemeClr val="tx1"/>
-                </a:solidFill>
-              </a:rPr>
-              <a:t>: Rocket propellant storage</a:t>
+              <a:t>WPN TYPE:</a:t>
             </a:r>
             <a:endParaRPr lang="hu-HU" sz="1100">
               <a:solidFill>
@@ -6274,15 +6251,37 @@
           </a:p>
           <a:p>
             <a:r>
-              <a:rPr lang="hu-HU" sz="1100">
-                <a:solidFill>
-                  <a:schemeClr val="tx1"/>
-                </a:solidFill>
-              </a:rPr>
-              <a:t>At least 1x 1,000 lbs advised</a:t>
-            </a:r>
-          </a:p>
-          <a:p>
+              <a:rPr lang="en-US" sz="1100">
+                <a:solidFill>
+                  <a:schemeClr val="tx1"/>
+                </a:solidFill>
+              </a:rPr>
+              <a:t>SRNTGT089 </a:t>
+            </a:r>
+            <a:r>
+              <a:rPr lang="en-US" sz="1100" b="1">
+                <a:solidFill>
+                  <a:schemeClr val="tx1"/>
+                </a:solidFill>
+              </a:rPr>
+              <a:t>A</a:t>
+            </a:r>
+            <a:r>
+              <a:rPr lang="hu-HU" sz="1100" b="1">
+                <a:solidFill>
+                  <a:schemeClr val="tx1"/>
+                </a:solidFill>
+              </a:rPr>
+              <a:t>-1</a:t>
+            </a:r>
+            <a:r>
+              <a:rPr lang="en-US" sz="1100">
+                <a:solidFill>
+                  <a:schemeClr val="tx1"/>
+                </a:solidFill>
+              </a:rPr>
+              <a:t>: Rocket propellant storage</a:t>
+            </a:r>
             <a:endParaRPr lang="hu-HU" sz="1100">
               <a:solidFill>
                 <a:schemeClr val="tx1"/>
@@ -6291,37 +6290,15 @@
           </a:p>
           <a:p>
             <a:r>
-              <a:rPr lang="en-US" sz="1100">
-                <a:solidFill>
-                  <a:schemeClr val="tx1"/>
-                </a:solidFill>
-              </a:rPr>
-              <a:t>SRNTGT089 </a:t>
-            </a:r>
-            <a:r>
-              <a:rPr lang="en-US" sz="1100" b="1">
-                <a:solidFill>
-                  <a:schemeClr val="tx1"/>
-                </a:solidFill>
-              </a:rPr>
-              <a:t>A</a:t>
-            </a:r>
-            <a:r>
-              <a:rPr lang="hu-HU" sz="1100" b="1">
-                <a:solidFill>
-                  <a:schemeClr val="tx1"/>
-                </a:solidFill>
-              </a:rPr>
-              <a:t>-2</a:t>
-            </a:r>
-            <a:r>
-              <a:rPr lang="en-US" sz="1100">
-                <a:solidFill>
-                  <a:schemeClr val="tx1"/>
-                </a:solidFill>
-              </a:rPr>
-              <a:t>: Rocket propellant storage</a:t>
-            </a:r>
+              <a:rPr lang="hu-HU" sz="1100">
+                <a:solidFill>
+                  <a:schemeClr val="tx1"/>
+                </a:solidFill>
+              </a:rPr>
+              <a:t>At least 1x 1,000 lbs advised</a:t>
+            </a:r>
+          </a:p>
+          <a:p>
             <a:endParaRPr lang="hu-HU" sz="1100">
               <a:solidFill>
                 <a:schemeClr val="tx1"/>
@@ -6330,15 +6307,37 @@
           </a:p>
           <a:p>
             <a:r>
-              <a:rPr lang="hu-HU" sz="1100">
-                <a:solidFill>
-                  <a:schemeClr val="tx1"/>
-                </a:solidFill>
-              </a:rPr>
-              <a:t>At least 1x 1,000 lbs advised</a:t>
-            </a:r>
-          </a:p>
-          <a:p>
+              <a:rPr lang="en-US" sz="1100">
+                <a:solidFill>
+                  <a:schemeClr val="tx1"/>
+                </a:solidFill>
+              </a:rPr>
+              <a:t>SRNTGT089 </a:t>
+            </a:r>
+            <a:r>
+              <a:rPr lang="en-US" sz="1100" b="1">
+                <a:solidFill>
+                  <a:schemeClr val="tx1"/>
+                </a:solidFill>
+              </a:rPr>
+              <a:t>A</a:t>
+            </a:r>
+            <a:r>
+              <a:rPr lang="hu-HU" sz="1100" b="1">
+                <a:solidFill>
+                  <a:schemeClr val="tx1"/>
+                </a:solidFill>
+              </a:rPr>
+              <a:t>-2</a:t>
+            </a:r>
+            <a:r>
+              <a:rPr lang="en-US" sz="1100">
+                <a:solidFill>
+                  <a:schemeClr val="tx1"/>
+                </a:solidFill>
+              </a:rPr>
+              <a:t>: Rocket propellant storage</a:t>
+            </a:r>
             <a:endParaRPr lang="hu-HU" sz="1100">
               <a:solidFill>
                 <a:schemeClr val="tx1"/>
@@ -6347,29 +6346,15 @@
           </a:p>
           <a:p>
             <a:r>
-              <a:rPr lang="en-US" sz="1100">
-                <a:solidFill>
-                  <a:schemeClr val="tx1"/>
-                </a:solidFill>
-              </a:rPr>
-              <a:t>SRNTGT089 </a:t>
-            </a:r>
-            <a:r>
-              <a:rPr lang="en-US" sz="1100" b="1">
-                <a:solidFill>
-                  <a:schemeClr val="tx1"/>
-                </a:solidFill>
-              </a:rPr>
-              <a:t>B</a:t>
-            </a:r>
-            <a:r>
-              <a:rPr lang="en-US" sz="1100">
-                <a:solidFill>
-                  <a:schemeClr val="tx1"/>
-                </a:solidFill>
-              </a:rPr>
-              <a:t>: Headquarter</a:t>
-            </a:r>
+              <a:rPr lang="hu-HU" sz="1100">
+                <a:solidFill>
+                  <a:schemeClr val="tx1"/>
+                </a:solidFill>
+              </a:rPr>
+              <a:t>At least 1x 1,000 lbs advised</a:t>
+            </a:r>
+          </a:p>
+          <a:p>
             <a:endParaRPr lang="hu-HU" sz="1100">
               <a:solidFill>
                 <a:schemeClr val="tx1"/>
@@ -6378,15 +6363,29 @@
           </a:p>
           <a:p>
             <a:r>
-              <a:rPr lang="hu-HU" sz="1100">
-                <a:solidFill>
-                  <a:schemeClr val="tx1"/>
-                </a:solidFill>
-              </a:rPr>
-              <a:t>Light office building for command staff, 1x500 lbs weapon sufficient</a:t>
-            </a:r>
-          </a:p>
-          <a:p>
+              <a:rPr lang="en-US" sz="1100">
+                <a:solidFill>
+                  <a:schemeClr val="tx1"/>
+                </a:solidFill>
+              </a:rPr>
+              <a:t>SRNTGT089 </a:t>
+            </a:r>
+            <a:r>
+              <a:rPr lang="en-US" sz="1100" b="1">
+                <a:solidFill>
+                  <a:schemeClr val="tx1"/>
+                </a:solidFill>
+              </a:rPr>
+              <a:t>B</a:t>
+            </a:r>
+            <a:r>
+              <a:rPr lang="en-US" sz="1100">
+                <a:solidFill>
+                  <a:schemeClr val="tx1"/>
+                </a:solidFill>
+              </a:rPr>
+              <a:t>: Headquarter</a:t>
+            </a:r>
             <a:endParaRPr lang="hu-HU" sz="1100">
               <a:solidFill>
                 <a:schemeClr val="tx1"/>
@@ -6395,29 +6394,15 @@
           </a:p>
           <a:p>
             <a:r>
-              <a:rPr lang="en-US" sz="1100">
-                <a:solidFill>
-                  <a:schemeClr val="tx1"/>
-                </a:solidFill>
-              </a:rPr>
-              <a:t>SRNTGT089 </a:t>
-            </a:r>
-            <a:r>
-              <a:rPr lang="en-US" sz="1100" b="1">
-                <a:solidFill>
-                  <a:schemeClr val="tx1"/>
-                </a:solidFill>
-              </a:rPr>
-              <a:t>C</a:t>
-            </a:r>
-            <a:r>
-              <a:rPr lang="en-US" sz="1100">
-                <a:solidFill>
-                  <a:schemeClr val="tx1"/>
-                </a:solidFill>
-              </a:rPr>
-              <a:t>: Repair facility</a:t>
-            </a:r>
+              <a:rPr lang="hu-HU" sz="1100">
+                <a:solidFill>
+                  <a:schemeClr val="tx1"/>
+                </a:solidFill>
+              </a:rPr>
+              <a:t>Light office building for command staff, 1x500 lbs weapon sufficient</a:t>
+            </a:r>
+          </a:p>
+          <a:p>
             <a:endParaRPr lang="hu-HU" sz="1100">
               <a:solidFill>
                 <a:schemeClr val="tx1"/>
@@ -6426,6 +6411,37 @@
           </a:p>
           <a:p>
             <a:r>
+              <a:rPr lang="en-US" sz="1100">
+                <a:solidFill>
+                  <a:schemeClr val="tx1"/>
+                </a:solidFill>
+              </a:rPr>
+              <a:t>SRNTGT089 </a:t>
+            </a:r>
+            <a:r>
+              <a:rPr lang="en-US" sz="1100" b="1">
+                <a:solidFill>
+                  <a:schemeClr val="tx1"/>
+                </a:solidFill>
+              </a:rPr>
+              <a:t>C</a:t>
+            </a:r>
+            <a:r>
+              <a:rPr lang="en-US" sz="1100">
+                <a:solidFill>
+                  <a:schemeClr val="tx1"/>
+                </a:solidFill>
+              </a:rPr>
+              <a:t>: Repair facility</a:t>
+            </a:r>
+            <a:endParaRPr lang="hu-HU" sz="1100">
+              <a:solidFill>
+                <a:schemeClr val="tx1"/>
+              </a:solidFill>
+            </a:endParaRPr>
+          </a:p>
+          <a:p>
+            <a:r>
               <a:rPr lang="hu-HU" sz="1100">
                 <a:solidFill>
                   <a:schemeClr val="tx1"/>
@@ -6499,7 +6515,7 @@
           <p:cNvPr id="51" name="Téglalap 50">
             <a:extLst>
               <a:ext uri="{FF2B5EF4-FFF2-40B4-BE49-F238E27FC236}">
-                <a16:creationId xmlns:a16="http://schemas.microsoft.com/office/drawing/2014/main" xmlns="" id="{7562C6C3-BF97-7D8E-8F74-E1A488282CC8}"/>
+                <a16:creationId xmlns:a16="http://schemas.microsoft.com/office/drawing/2014/main" id="{7562C6C3-BF97-7D8E-8F74-E1A488282CC8}"/>
               </a:ext>
             </a:extLst>
           </p:cNvPr>
@@ -6550,7 +6566,7 @@
           <p:cNvPr id="17" name="Prostokąt 33">
             <a:extLst>
               <a:ext uri="{FF2B5EF4-FFF2-40B4-BE49-F238E27FC236}">
-                <a16:creationId xmlns:a16="http://schemas.microsoft.com/office/drawing/2014/main" xmlns="" id="{8320D5D2-33EF-7FFC-9E77-F9222E8D66A0}"/>
+                <a16:creationId xmlns:a16="http://schemas.microsoft.com/office/drawing/2014/main" id="{8320D5D2-33EF-7FFC-9E77-F9222E8D66A0}"/>
               </a:ext>
             </a:extLst>
           </p:cNvPr>
@@ -6640,7 +6656,7 @@
           <p:cNvPr id="18" name="Straight Arrow Connector 51">
             <a:extLst>
               <a:ext uri="{FF2B5EF4-FFF2-40B4-BE49-F238E27FC236}">
-                <a16:creationId xmlns:a16="http://schemas.microsoft.com/office/drawing/2014/main" xmlns="" id="{755E25D7-B3BC-80B8-FA10-3F956C540249}"/>
+                <a16:creationId xmlns:a16="http://schemas.microsoft.com/office/drawing/2014/main" id="{755E25D7-B3BC-80B8-FA10-3F956C540249}"/>
               </a:ext>
             </a:extLst>
           </p:cNvPr>
@@ -6686,7 +6702,7 @@
           <p:cNvPr id="20" name="Prostokąt 33">
             <a:extLst>
               <a:ext uri="{FF2B5EF4-FFF2-40B4-BE49-F238E27FC236}">
-                <a16:creationId xmlns:a16="http://schemas.microsoft.com/office/drawing/2014/main" xmlns="" id="{88D17248-401D-E1BB-8A56-57635CECB561}"/>
+                <a16:creationId xmlns:a16="http://schemas.microsoft.com/office/drawing/2014/main" id="{88D17248-401D-E1BB-8A56-57635CECB561}"/>
               </a:ext>
             </a:extLst>
           </p:cNvPr>
@@ -6776,7 +6792,7 @@
           <p:cNvPr id="22" name="Prostokąt 33">
             <a:extLst>
               <a:ext uri="{FF2B5EF4-FFF2-40B4-BE49-F238E27FC236}">
-                <a16:creationId xmlns:a16="http://schemas.microsoft.com/office/drawing/2014/main" xmlns="" id="{40D71F45-066C-6916-1866-7C12DF4E0AB6}"/>
+                <a16:creationId xmlns:a16="http://schemas.microsoft.com/office/drawing/2014/main" id="{40D71F45-066C-6916-1866-7C12DF4E0AB6}"/>
               </a:ext>
             </a:extLst>
           </p:cNvPr>
@@ -6866,7 +6882,7 @@
           <p:cNvPr id="24" name="Straight Arrow Connector 51">
             <a:extLst>
               <a:ext uri="{FF2B5EF4-FFF2-40B4-BE49-F238E27FC236}">
-                <a16:creationId xmlns:a16="http://schemas.microsoft.com/office/drawing/2014/main" xmlns="" id="{88F0D667-1D03-EBAD-7A05-6D8E875CEB77}"/>
+                <a16:creationId xmlns:a16="http://schemas.microsoft.com/office/drawing/2014/main" id="{88F0D667-1D03-EBAD-7A05-6D8E875CEB77}"/>
               </a:ext>
             </a:extLst>
           </p:cNvPr>
@@ -6910,7 +6926,7 @@
           <p:cNvPr id="27" name="Straight Arrow Connector 51">
             <a:extLst>
               <a:ext uri="{FF2B5EF4-FFF2-40B4-BE49-F238E27FC236}">
-                <a16:creationId xmlns:a16="http://schemas.microsoft.com/office/drawing/2014/main" xmlns="" id="{E027AEFE-5F3C-93AF-F816-5406681DD948}"/>
+                <a16:creationId xmlns:a16="http://schemas.microsoft.com/office/drawing/2014/main" id="{E027AEFE-5F3C-93AF-F816-5406681DD948}"/>
               </a:ext>
             </a:extLst>
           </p:cNvPr>
@@ -6956,7 +6972,7 @@
           <p:cNvPr id="32" name="Szabadkézi sokszög: alakzat 31">
             <a:extLst>
               <a:ext uri="{FF2B5EF4-FFF2-40B4-BE49-F238E27FC236}">
-                <a16:creationId xmlns:a16="http://schemas.microsoft.com/office/drawing/2014/main" xmlns="" id="{133E067E-ED97-0561-F920-45FDDBF7DDD6}"/>
+                <a16:creationId xmlns:a16="http://schemas.microsoft.com/office/drawing/2014/main" id="{133E067E-ED97-0561-F920-45FDDBF7DDD6}"/>
               </a:ext>
             </a:extLst>
           </p:cNvPr>
@@ -7059,7 +7075,7 @@
           <p:cNvPr id="35" name="Szabadkézi sokszög: alakzat 34">
             <a:extLst>
               <a:ext uri="{FF2B5EF4-FFF2-40B4-BE49-F238E27FC236}">
-                <a16:creationId xmlns:a16="http://schemas.microsoft.com/office/drawing/2014/main" xmlns="" id="{FBDF5B3B-729B-04E5-0E1C-EDC6597BE424}"/>
+                <a16:creationId xmlns:a16="http://schemas.microsoft.com/office/drawing/2014/main" id="{FBDF5B3B-729B-04E5-0E1C-EDC6597BE424}"/>
               </a:ext>
             </a:extLst>
           </p:cNvPr>
@@ -7166,7 +7182,7 @@
           <p:cNvPr id="36" name="Szabadkézi sokszög: alakzat 35">
             <a:extLst>
               <a:ext uri="{FF2B5EF4-FFF2-40B4-BE49-F238E27FC236}">
-                <a16:creationId xmlns:a16="http://schemas.microsoft.com/office/drawing/2014/main" xmlns="" id="{5811F118-105F-CFB7-C2B0-08EFA7C0A49F}"/>
+                <a16:creationId xmlns:a16="http://schemas.microsoft.com/office/drawing/2014/main" id="{5811F118-105F-CFB7-C2B0-08EFA7C0A49F}"/>
               </a:ext>
             </a:extLst>
           </p:cNvPr>
@@ -7269,7 +7285,7 @@
           <p:cNvPr id="38" name="Szabadkézi sokszög: alakzat 37">
             <a:extLst>
               <a:ext uri="{FF2B5EF4-FFF2-40B4-BE49-F238E27FC236}">
-                <a16:creationId xmlns:a16="http://schemas.microsoft.com/office/drawing/2014/main" xmlns="" id="{E64F177F-4178-4ADC-DB52-BDDC3AB2161D}"/>
+                <a16:creationId xmlns:a16="http://schemas.microsoft.com/office/drawing/2014/main" id="{E64F177F-4178-4ADC-DB52-BDDC3AB2161D}"/>
               </a:ext>
             </a:extLst>
           </p:cNvPr>
@@ -7372,7 +7388,7 @@
           <p:cNvPr id="44" name="Téglalap 43">
             <a:extLst>
               <a:ext uri="{FF2B5EF4-FFF2-40B4-BE49-F238E27FC236}">
-                <a16:creationId xmlns:a16="http://schemas.microsoft.com/office/drawing/2014/main" xmlns="" id="{54B2D455-FE5F-E8DA-7CEE-8D0D53E1EBA5}"/>
+                <a16:creationId xmlns:a16="http://schemas.microsoft.com/office/drawing/2014/main" id="{54B2D455-FE5F-E8DA-7CEE-8D0D53E1EBA5}"/>
               </a:ext>
             </a:extLst>
           </p:cNvPr>
@@ -7421,7 +7437,7 @@
     </p:spTree>
     <p:extLst>
       <p:ext uri="{BB962C8B-B14F-4D97-AF65-F5344CB8AC3E}">
-        <p14:creationId xmlns:p14="http://schemas.microsoft.com/office/powerpoint/2010/main" xmlns="" val="721945511"/>
+        <p14:creationId xmlns:p14="http://schemas.microsoft.com/office/powerpoint/2010/main" val="721945511"/>
       </p:ext>
     </p:extLst>
   </p:cSld>
@@ -7439,7 +7455,7 @@
         <p:cNvPr id="1" name="">
           <a:extLst>
             <a:ext uri="{FF2B5EF4-FFF2-40B4-BE49-F238E27FC236}">
-              <a16:creationId xmlns:a16="http://schemas.microsoft.com/office/drawing/2014/main" xmlns="" id="{99E991EF-1D8F-5F36-C518-09588391749B}"/>
+              <a16:creationId xmlns:a16="http://schemas.microsoft.com/office/drawing/2014/main" id="{99E991EF-1D8F-5F36-C518-09588391749B}"/>
             </a:ext>
           </a:extLst>
         </p:cNvPr>
@@ -7459,7 +7475,7 @@
           <p:cNvPr id="2" name="Tittel 1">
             <a:extLst>
               <a:ext uri="{FF2B5EF4-FFF2-40B4-BE49-F238E27FC236}">
-                <a16:creationId xmlns:a16="http://schemas.microsoft.com/office/drawing/2014/main" xmlns="" id="{6492B325-5E8D-EEF7-3959-C4EEC892094B}"/>
+                <a16:creationId xmlns:a16="http://schemas.microsoft.com/office/drawing/2014/main" id="{6492B325-5E8D-EEF7-3959-C4EEC892094B}"/>
               </a:ext>
             </a:extLst>
           </p:cNvPr>
@@ -7506,7 +7522,7 @@
           <p:cNvPr id="37" name="Prostokąt 36">
             <a:extLst>
               <a:ext uri="{FF2B5EF4-FFF2-40B4-BE49-F238E27FC236}">
-                <a16:creationId xmlns:a16="http://schemas.microsoft.com/office/drawing/2014/main" xmlns="" id="{42881CF9-A79B-4A4B-E42F-1CE6A6D1B671}"/>
+                <a16:creationId xmlns:a16="http://schemas.microsoft.com/office/drawing/2014/main" id="{42881CF9-A79B-4A4B-E42F-1CE6A6D1B671}"/>
               </a:ext>
             </a:extLst>
           </p:cNvPr>
@@ -7590,7 +7606,7 @@
           <p:cNvPr id="4" name="Kép 3">
             <a:extLst>
               <a:ext uri="{FF2B5EF4-FFF2-40B4-BE49-F238E27FC236}">
-                <a16:creationId xmlns:a16="http://schemas.microsoft.com/office/drawing/2014/main" xmlns="" id="{E2DCE21C-6F42-16EC-3A4D-F6147734DE03}"/>
+                <a16:creationId xmlns:a16="http://schemas.microsoft.com/office/drawing/2014/main" id="{E2DCE21C-6F42-16EC-3A4D-F6147734DE03}"/>
               </a:ext>
             </a:extLst>
           </p:cNvPr>
@@ -7604,7 +7620,7 @@
             <a:grayscl/>
             <a:extLst>
               <a:ext uri="{28A0092B-C50C-407E-A947-70E740481C1C}">
-                <a14:useLocalDpi xmlns:a14="http://schemas.microsoft.com/office/drawing/2010/main" xmlns="" val="0"/>
+                <a14:useLocalDpi xmlns:a14="http://schemas.microsoft.com/office/drawing/2010/main" val="0"/>
               </a:ext>
             </a:extLst>
           </a:blip>
@@ -7627,7 +7643,7 @@
           <p:cNvPr id="7" name="Kép 6">
             <a:extLst>
               <a:ext uri="{FF2B5EF4-FFF2-40B4-BE49-F238E27FC236}">
-                <a16:creationId xmlns:a16="http://schemas.microsoft.com/office/drawing/2014/main" xmlns="" id="{F29D505A-CE45-4192-7112-B0529DBA3995}"/>
+                <a16:creationId xmlns:a16="http://schemas.microsoft.com/office/drawing/2014/main" id="{F29D505A-CE45-4192-7112-B0529DBA3995}"/>
               </a:ext>
             </a:extLst>
           </p:cNvPr>
@@ -7641,7 +7657,7 @@
             <a:biLevel thresh="50000"/>
             <a:extLst>
               <a:ext uri="{28A0092B-C50C-407E-A947-70E740481C1C}">
-                <a14:useLocalDpi xmlns:a14="http://schemas.microsoft.com/office/drawing/2010/main" xmlns="" val="0"/>
+                <a14:useLocalDpi xmlns:a14="http://schemas.microsoft.com/office/drawing/2010/main" val="0"/>
               </a:ext>
             </a:extLst>
           </a:blip>
@@ -7664,7 +7680,7 @@
           <p:cNvPr id="55" name="Pil opp 2">
             <a:extLst>
               <a:ext uri="{FF2B5EF4-FFF2-40B4-BE49-F238E27FC236}">
-                <a16:creationId xmlns:a16="http://schemas.microsoft.com/office/drawing/2014/main" xmlns="" id="{BC20D641-2DA6-0D2D-B483-EBE29EF0F29A}"/>
+                <a16:creationId xmlns:a16="http://schemas.microsoft.com/office/drawing/2014/main" id="{BC20D641-2DA6-0D2D-B483-EBE29EF0F29A}"/>
               </a:ext>
             </a:extLst>
           </p:cNvPr>
@@ -7719,7 +7735,7 @@
           <p:cNvPr id="8" name="Ellipszis 7">
             <a:extLst>
               <a:ext uri="{FF2B5EF4-FFF2-40B4-BE49-F238E27FC236}">
-                <a16:creationId xmlns:a16="http://schemas.microsoft.com/office/drawing/2014/main" xmlns="" id="{1E01E49F-DF45-7C96-AECB-EAE4514E5E6E}"/>
+                <a16:creationId xmlns:a16="http://schemas.microsoft.com/office/drawing/2014/main" id="{1E01E49F-DF45-7C96-AECB-EAE4514E5E6E}"/>
               </a:ext>
             </a:extLst>
           </p:cNvPr>
@@ -7771,7 +7787,7 @@
           <p:cNvPr id="9" name="Ellipszis 8">
             <a:extLst>
               <a:ext uri="{FF2B5EF4-FFF2-40B4-BE49-F238E27FC236}">
-                <a16:creationId xmlns:a16="http://schemas.microsoft.com/office/drawing/2014/main" xmlns="" id="{0FE4C27A-B15D-87EE-3993-6118B9297B90}"/>
+                <a16:creationId xmlns:a16="http://schemas.microsoft.com/office/drawing/2014/main" id="{0FE4C27A-B15D-87EE-3993-6118B9297B90}"/>
               </a:ext>
             </a:extLst>
           </p:cNvPr>
@@ -7823,7 +7839,7 @@
           <p:cNvPr id="11" name="Háromszög 10">
             <a:extLst>
               <a:ext uri="{FF2B5EF4-FFF2-40B4-BE49-F238E27FC236}">
-                <a16:creationId xmlns:a16="http://schemas.microsoft.com/office/drawing/2014/main" xmlns="" id="{F88F8F20-76BB-F09D-BF27-280141DFAA73}"/>
+                <a16:creationId xmlns:a16="http://schemas.microsoft.com/office/drawing/2014/main" id="{F88F8F20-76BB-F09D-BF27-280141DFAA73}"/>
               </a:ext>
             </a:extLst>
           </p:cNvPr>
@@ -7832,8 +7848,8 @@
         </p:nvSpPr>
         <p:spPr>
           <a:xfrm>
-            <a:off x="5436096" y="1373928"/>
-            <a:ext cx="864096" cy="811467"/>
+            <a:off x="5466406" y="1369218"/>
+            <a:ext cx="683487" cy="549750"/>
           </a:xfrm>
           <a:prstGeom prst="triangle">
             <a:avLst/>
@@ -7875,7 +7891,7 @@
           <p:cNvPr id="12" name="Ellipszis 11">
             <a:extLst>
               <a:ext uri="{FF2B5EF4-FFF2-40B4-BE49-F238E27FC236}">
-                <a16:creationId xmlns:a16="http://schemas.microsoft.com/office/drawing/2014/main" xmlns="" id="{ADD27E90-11F7-B3DB-41DD-174242B013D8}"/>
+                <a16:creationId xmlns:a16="http://schemas.microsoft.com/office/drawing/2014/main" id="{ADD27E90-11F7-B3DB-41DD-174242B013D8}"/>
               </a:ext>
             </a:extLst>
           </p:cNvPr>
@@ -7927,7 +7943,7 @@
           <p:cNvPr id="14" name="Prostokąt 33">
             <a:extLst>
               <a:ext uri="{FF2B5EF4-FFF2-40B4-BE49-F238E27FC236}">
-                <a16:creationId xmlns:a16="http://schemas.microsoft.com/office/drawing/2014/main" xmlns="" id="{C093B3AD-755D-074D-AE43-9B88919509FB}"/>
+                <a16:creationId xmlns:a16="http://schemas.microsoft.com/office/drawing/2014/main" id="{C093B3AD-755D-074D-AE43-9B88919509FB}"/>
               </a:ext>
             </a:extLst>
           </p:cNvPr>
@@ -8017,7 +8033,7 @@
           <p:cNvPr id="15" name="Pil opp 2">
             <a:extLst>
               <a:ext uri="{FF2B5EF4-FFF2-40B4-BE49-F238E27FC236}">
-                <a16:creationId xmlns:a16="http://schemas.microsoft.com/office/drawing/2014/main" xmlns="" id="{FA60BDFE-6E31-A3FA-40C5-388A662AB19B}"/>
+                <a16:creationId xmlns:a16="http://schemas.microsoft.com/office/drawing/2014/main" id="{FA60BDFE-6E31-A3FA-40C5-388A662AB19B}"/>
               </a:ext>
             </a:extLst>
           </p:cNvPr>
@@ -8072,7 +8088,7 @@
           <p:cNvPr id="19" name="Egyenes összekötő nyíllal 18">
             <a:extLst>
               <a:ext uri="{FF2B5EF4-FFF2-40B4-BE49-F238E27FC236}">
-                <a16:creationId xmlns:a16="http://schemas.microsoft.com/office/drawing/2014/main" xmlns="" id="{44D76026-B927-490D-8A8D-7EDF08B475F3}"/>
+                <a16:creationId xmlns:a16="http://schemas.microsoft.com/office/drawing/2014/main" id="{44D76026-B927-490D-8A8D-7EDF08B475F3}"/>
               </a:ext>
             </a:extLst>
           </p:cNvPr>
@@ -8115,7 +8131,7 @@
           <p:cNvPr id="23" name="Prostokąt 33">
             <a:extLst>
               <a:ext uri="{FF2B5EF4-FFF2-40B4-BE49-F238E27FC236}">
-                <a16:creationId xmlns:a16="http://schemas.microsoft.com/office/drawing/2014/main" xmlns="" id="{DDE17000-82AA-84C4-49C9-9913FB5D7EE8}"/>
+                <a16:creationId xmlns:a16="http://schemas.microsoft.com/office/drawing/2014/main" id="{DDE17000-82AA-84C4-49C9-9913FB5D7EE8}"/>
               </a:ext>
             </a:extLst>
           </p:cNvPr>
@@ -8179,7 +8195,7 @@
     </p:spTree>
     <p:extLst>
       <p:ext uri="{BB962C8B-B14F-4D97-AF65-F5344CB8AC3E}">
-        <p14:creationId xmlns:p14="http://schemas.microsoft.com/office/powerpoint/2010/main" xmlns="" val="2950164142"/>
+        <p14:creationId xmlns:p14="http://schemas.microsoft.com/office/powerpoint/2010/main" val="2950164142"/>
       </p:ext>
     </p:extLst>
   </p:cSld>

</xml_diff>